<commit_message>
Improve Text Classification presentation
</commit_message>
<xml_diff>
--- a/presentations/TextClassification.pptx
+++ b/presentations/TextClassification.pptx
@@ -199,7 +199,7 @@
           <a:p>
             <a:fld id="{0CAC9370-0124-4E0D-A77D-5B0E1B20DCEC}" type="datetimeFigureOut">
               <a:rPr lang="el-GR" smtClean="0"/>
-              <a:t>15/6/2018</a:t>
+              <a:t>19/6/2018</a:t>
             </a:fld>
             <a:endParaRPr lang="el-GR"/>
           </a:p>
@@ -1327,7 +1327,7 @@
           <a:p>
             <a:fld id="{F2853615-BFDE-46DE-814C-47EC6EF6D371}" type="datetimeFigureOut">
               <a:rPr lang="el-GR" smtClean="0"/>
-              <a:t>15/6/2018</a:t>
+              <a:t>19/6/2018</a:t>
             </a:fld>
             <a:endParaRPr lang="el-GR"/>
           </a:p>
@@ -1527,7 +1527,7 @@
           <a:p>
             <a:fld id="{F2853615-BFDE-46DE-814C-47EC6EF6D371}" type="datetimeFigureOut">
               <a:rPr lang="el-GR" smtClean="0"/>
-              <a:t>15/6/2018</a:t>
+              <a:t>19/6/2018</a:t>
             </a:fld>
             <a:endParaRPr lang="el-GR"/>
           </a:p>
@@ -1702,7 +1702,7 @@
           <a:p>
             <a:fld id="{F2853615-BFDE-46DE-814C-47EC6EF6D371}" type="datetimeFigureOut">
               <a:rPr lang="el-GR" smtClean="0"/>
-              <a:t>15/6/2018</a:t>
+              <a:t>19/6/2018</a:t>
             </a:fld>
             <a:endParaRPr lang="el-GR"/>
           </a:p>
@@ -1867,7 +1867,7 @@
           <a:p>
             <a:fld id="{F2853615-BFDE-46DE-814C-47EC6EF6D371}" type="datetimeFigureOut">
               <a:rPr lang="el-GR" smtClean="0"/>
-              <a:t>15/6/2018</a:t>
+              <a:t>19/6/2018</a:t>
             </a:fld>
             <a:endParaRPr lang="el-GR"/>
           </a:p>
@@ -2006,7 +2006,7 @@
           <a:p>
             <a:fld id="{F2853615-BFDE-46DE-814C-47EC6EF6D371}" type="datetimeFigureOut">
               <a:rPr lang="el-GR" smtClean="0"/>
-              <a:t>15/6/2018</a:t>
+              <a:t>19/6/2018</a:t>
             </a:fld>
             <a:endParaRPr lang="el-GR"/>
           </a:p>
@@ -2324,7 +2324,7 @@
           <a:p>
             <a:fld id="{F2853615-BFDE-46DE-814C-47EC6EF6D371}" type="datetimeFigureOut">
               <a:rPr lang="el-GR" smtClean="0"/>
-              <a:t>15/6/2018</a:t>
+              <a:t>19/6/2018</a:t>
             </a:fld>
             <a:endParaRPr lang="el-GR"/>
           </a:p>
@@ -2790,7 +2790,7 @@
           <a:p>
             <a:fld id="{F2853615-BFDE-46DE-814C-47EC6EF6D371}" type="datetimeFigureOut">
               <a:rPr lang="el-GR" smtClean="0"/>
-              <a:t>15/6/2018</a:t>
+              <a:t>19/6/2018</a:t>
             </a:fld>
             <a:endParaRPr lang="el-GR"/>
           </a:p>
@@ -2938,7 +2938,7 @@
           <a:p>
             <a:fld id="{F2853615-BFDE-46DE-814C-47EC6EF6D371}" type="datetimeFigureOut">
               <a:rPr lang="el-GR" smtClean="0"/>
-              <a:t>15/6/2018</a:t>
+              <a:t>19/6/2018</a:t>
             </a:fld>
             <a:endParaRPr lang="el-GR"/>
           </a:p>
@@ -3028,7 +3028,7 @@
           <a:p>
             <a:fld id="{F2853615-BFDE-46DE-814C-47EC6EF6D371}" type="datetimeFigureOut">
               <a:rPr lang="el-GR" smtClean="0"/>
-              <a:t>15/6/2018</a:t>
+              <a:t>19/6/2018</a:t>
             </a:fld>
             <a:endParaRPr lang="el-GR"/>
           </a:p>
@@ -3302,7 +3302,7 @@
           <a:p>
             <a:fld id="{F2853615-BFDE-46DE-814C-47EC6EF6D371}" type="datetimeFigureOut">
               <a:rPr lang="el-GR" smtClean="0"/>
-              <a:t>15/6/2018</a:t>
+              <a:t>19/6/2018</a:t>
             </a:fld>
             <a:endParaRPr lang="el-GR"/>
           </a:p>
@@ -3607,7 +3607,7 @@
           <a:p>
             <a:fld id="{F2853615-BFDE-46DE-814C-47EC6EF6D371}" type="datetimeFigureOut">
               <a:rPr lang="el-GR" smtClean="0"/>
-              <a:t>15/6/2018</a:t>
+              <a:t>19/6/2018</a:t>
             </a:fld>
             <a:endParaRPr lang="el-GR"/>
           </a:p>
@@ -3905,7 +3905,7 @@
           <a:p>
             <a:fld id="{F2853615-BFDE-46DE-814C-47EC6EF6D371}" type="datetimeFigureOut">
               <a:rPr lang="el-GR" smtClean="0"/>
-              <a:t>15/6/2018</a:t>
+              <a:t>19/6/2018</a:t>
             </a:fld>
             <a:endParaRPr lang="el-GR"/>
           </a:p>
@@ -5066,7 +5066,7 @@
           <p:nvPr>
             <p:extLst>
               <p:ext uri="{D42A27DB-BD31-4B8C-83A1-F6EECF244321}">
-                <p14:modId xmlns:p14="http://schemas.microsoft.com/office/powerpoint/2010/main" val="1314336016"/>
+                <p14:modId xmlns:p14="http://schemas.microsoft.com/office/powerpoint/2010/main" val="3508605045"/>
               </p:ext>
             </p:extLst>
           </p:nvPr>
@@ -5354,10 +5354,10 @@
                     <a:lstStyle/>
                     <a:p>
                       <a:r>
-                        <a:rPr lang="en-US" b="1" dirty="0" smtClean="0"/>
+                        <a:rPr lang="en-US" b="0" dirty="0" smtClean="0"/>
                         <a:t>word</a:t>
                       </a:r>
-                      <a:endParaRPr lang="el-GR" b="1" dirty="0"/>
+                      <a:endParaRPr lang="el-GR" b="0" dirty="0"/>
                     </a:p>
                   </a:txBody>
                   <a:tcPr/>
@@ -5368,10 +5368,10 @@
                     <a:lstStyle/>
                     <a:p>
                       <a:r>
-                        <a:rPr lang="en-US" b="1" dirty="0" smtClean="0"/>
+                        <a:rPr lang="en-US" b="0" dirty="0" smtClean="0"/>
                         <a:t>5</a:t>
                       </a:r>
-                      <a:endParaRPr lang="el-GR" b="1" dirty="0"/>
+                      <a:endParaRPr lang="el-GR" b="0" dirty="0"/>
                     </a:p>
                   </a:txBody>
                   <a:tcPr/>
@@ -5698,36 +5698,52 @@
         </p:nvSpPr>
         <p:spPr/>
         <p:txBody>
+          <a:bodyPr>
+            <a:normAutofit/>
+          </a:bodyPr>
+          <a:lstStyle/>
+          <a:p>
+            <a:r>
+              <a:rPr lang="en-US" dirty="0" smtClean="0"/>
+              <a:t>One-hot Encoding</a:t>
+            </a:r>
+            <a:endParaRPr lang="en-US" dirty="0"/>
+          </a:p>
+        </p:txBody>
+      </p:sp>
+      <p:sp>
+        <p:nvSpPr>
+          <p:cNvPr id="3" name="Θέση περιεχομένου 2"/>
+          <p:cNvSpPr>
+            <a:spLocks noGrp="1"/>
+          </p:cNvSpPr>
+          <p:nvPr>
+            <p:ph idx="1"/>
+          </p:nvPr>
+        </p:nvSpPr>
+        <p:spPr>
+          <a:xfrm>
+            <a:off x="457200" y="1600200"/>
+            <a:ext cx="8340477" cy="4876800"/>
+          </a:xfrm>
+        </p:spPr>
+        <p:txBody>
           <a:bodyPr/>
           <a:lstStyle/>
           <a:p>
             <a:r>
               <a:rPr lang="en-US" dirty="0" smtClean="0"/>
-              <a:t>Vector Space Model</a:t>
-            </a:r>
-            <a:endParaRPr lang="en-US" dirty="0"/>
-          </a:p>
-        </p:txBody>
-      </p:sp>
-      <p:sp>
-        <p:nvSpPr>
-          <p:cNvPr id="3" name="Θέση περιεχομένου 2"/>
-          <p:cNvSpPr>
-            <a:spLocks noGrp="1"/>
-          </p:cNvSpPr>
-          <p:nvPr>
-            <p:ph idx="1"/>
-          </p:nvPr>
-        </p:nvSpPr>
-        <p:spPr/>
-        <p:txBody>
-          <a:bodyPr/>
-          <a:lstStyle/>
-          <a:p>
+              <a:t>Document Representation (</a:t>
+            </a:r>
+            <a:r>
+              <a:rPr lang="en-US" dirty="0"/>
+              <a:t>similar to Vector Space </a:t>
+            </a:r>
             <a:r>
               <a:rPr lang="en-US" dirty="0" smtClean="0"/>
-              <a:t>Representation of documents</a:t>
-            </a:r>
+              <a:t>Model)</a:t>
+            </a:r>
+            <a:endParaRPr lang="en-US" dirty="0" smtClean="0"/>
           </a:p>
           <a:p>
             <a:r>
@@ -6835,13 +6851,8 @@
           <a:p>
             <a:r>
               <a:rPr lang="en-US" dirty="0" smtClean="0"/>
-              <a:t>Like RNN but </a:t>
-            </a:r>
-            <a:r>
-              <a:rPr lang="en-US" dirty="0" smtClean="0"/>
-              <a:t>also</a:t>
-            </a:r>
-            <a:endParaRPr lang="en-US" dirty="0" smtClean="0"/>
+              <a:t>Like RNN but also</a:t>
+            </a:r>
           </a:p>
           <a:p>
             <a:pPr marL="0" indent="0">
@@ -6858,7 +6869,6 @@
               <a:rPr lang="en-US" dirty="0" smtClean="0"/>
               <a:t>determines how much</a:t>
             </a:r>
-            <a:endParaRPr lang="en-US" dirty="0" smtClean="0"/>
           </a:p>
           <a:p>
             <a:pPr marL="0" indent="0">

</xml_diff>